<commit_message>
#add uitest for music, map view controller.
</commit_message>
<xml_diff>
--- a/document/VFA-iOS-testing.pptx
+++ b/document/VFA-iOS-testing.pptx
@@ -16,7 +16,8 @@
     <p:sldId id="261" r:id="rId10"/>
     <p:sldId id="258" r:id="rId11"/>
     <p:sldId id="267" r:id="rId12"/>
-    <p:sldId id="262" r:id="rId13"/>
+    <p:sldId id="268" r:id="rId13"/>
+    <p:sldId id="262" r:id="rId14"/>
   </p:sldIdLst>
   <p:sldSz cx="12192000" cy="6858000"/>
   <p:notesSz cx="6858000" cy="9144000"/>
@@ -115,6 +116,11 @@
       </a:defRPr>
     </a:lvl9pPr>
   </p:defaultTextStyle>
+  <p:extLst>
+    <p:ext uri="{EFAFB233-063F-42B5-8137-9DF3F51BA10A}">
+      <p15:sldGuideLst xmlns:p15="http://schemas.microsoft.com/office/powerpoint/2012/main"/>
+    </p:ext>
+  </p:extLst>
 </p:presentation>
 </file>
 
@@ -267,7 +273,7 @@
           <a:p>
             <a:fld id="{1A8DD26B-907E-8841-BF29-3DBA5247EF1B}" type="datetimeFigureOut">
               <a:rPr lang="en-VN" smtClean="0"/>
-              <a:t>6/16/20</a:t>
+              <a:t>6/17/20</a:t>
             </a:fld>
             <a:endParaRPr lang="en-VN"/>
           </a:p>
@@ -467,7 +473,7 @@
           <a:p>
             <a:fld id="{1A8DD26B-907E-8841-BF29-3DBA5247EF1B}" type="datetimeFigureOut">
               <a:rPr lang="en-VN" smtClean="0"/>
-              <a:t>6/16/20</a:t>
+              <a:t>6/17/20</a:t>
             </a:fld>
             <a:endParaRPr lang="en-VN"/>
           </a:p>
@@ -677,7 +683,7 @@
           <a:p>
             <a:fld id="{1A8DD26B-907E-8841-BF29-3DBA5247EF1B}" type="datetimeFigureOut">
               <a:rPr lang="en-VN" smtClean="0"/>
-              <a:t>6/16/20</a:t>
+              <a:t>6/17/20</a:t>
             </a:fld>
             <a:endParaRPr lang="en-VN"/>
           </a:p>
@@ -877,7 +883,7 @@
           <a:p>
             <a:fld id="{1A8DD26B-907E-8841-BF29-3DBA5247EF1B}" type="datetimeFigureOut">
               <a:rPr lang="en-VN" smtClean="0"/>
-              <a:t>6/16/20</a:t>
+              <a:t>6/17/20</a:t>
             </a:fld>
             <a:endParaRPr lang="en-VN"/>
           </a:p>
@@ -1153,7 +1159,7 @@
           <a:p>
             <a:fld id="{1A8DD26B-907E-8841-BF29-3DBA5247EF1B}" type="datetimeFigureOut">
               <a:rPr lang="en-VN" smtClean="0"/>
-              <a:t>6/16/20</a:t>
+              <a:t>6/17/20</a:t>
             </a:fld>
             <a:endParaRPr lang="en-VN"/>
           </a:p>
@@ -1421,7 +1427,7 @@
           <a:p>
             <a:fld id="{1A8DD26B-907E-8841-BF29-3DBA5247EF1B}" type="datetimeFigureOut">
               <a:rPr lang="en-VN" smtClean="0"/>
-              <a:t>6/16/20</a:t>
+              <a:t>6/17/20</a:t>
             </a:fld>
             <a:endParaRPr lang="en-VN"/>
           </a:p>
@@ -1836,7 +1842,7 @@
           <a:p>
             <a:fld id="{1A8DD26B-907E-8841-BF29-3DBA5247EF1B}" type="datetimeFigureOut">
               <a:rPr lang="en-VN" smtClean="0"/>
-              <a:t>6/16/20</a:t>
+              <a:t>6/17/20</a:t>
             </a:fld>
             <a:endParaRPr lang="en-VN"/>
           </a:p>
@@ -1978,7 +1984,7 @@
           <a:p>
             <a:fld id="{1A8DD26B-907E-8841-BF29-3DBA5247EF1B}" type="datetimeFigureOut">
               <a:rPr lang="en-VN" smtClean="0"/>
-              <a:t>6/16/20</a:t>
+              <a:t>6/17/20</a:t>
             </a:fld>
             <a:endParaRPr lang="en-VN"/>
           </a:p>
@@ -2091,7 +2097,7 @@
           <a:p>
             <a:fld id="{1A8DD26B-907E-8841-BF29-3DBA5247EF1B}" type="datetimeFigureOut">
               <a:rPr lang="en-VN" smtClean="0"/>
-              <a:t>6/16/20</a:t>
+              <a:t>6/17/20</a:t>
             </a:fld>
             <a:endParaRPr lang="en-VN"/>
           </a:p>
@@ -2404,7 +2410,7 @@
           <a:p>
             <a:fld id="{1A8DD26B-907E-8841-BF29-3DBA5247EF1B}" type="datetimeFigureOut">
               <a:rPr lang="en-VN" smtClean="0"/>
-              <a:t>6/16/20</a:t>
+              <a:t>6/17/20</a:t>
             </a:fld>
             <a:endParaRPr lang="en-VN"/>
           </a:p>
@@ -2693,7 +2699,7 @@
           <a:p>
             <a:fld id="{1A8DD26B-907E-8841-BF29-3DBA5247EF1B}" type="datetimeFigureOut">
               <a:rPr lang="en-VN" smtClean="0"/>
-              <a:t>6/16/20</a:t>
+              <a:t>6/17/20</a:t>
             </a:fld>
             <a:endParaRPr lang="en-VN"/>
           </a:p>
@@ -2936,7 +2942,7 @@
           <a:p>
             <a:fld id="{1A8DD26B-907E-8841-BF29-3DBA5247EF1B}" type="datetimeFigureOut">
               <a:rPr lang="en-VN" smtClean="0"/>
-              <a:t>6/16/20</a:t>
+              <a:t>6/17/20</a:t>
             </a:fld>
             <a:endParaRPr lang="en-VN"/>
           </a:p>
@@ -3625,6 +3631,92 @@
           <p:cNvPr id="2" name="Title 1">
             <a:extLst>
               <a:ext uri="{FF2B5EF4-FFF2-40B4-BE49-F238E27FC236}">
+                <a16:creationId xmlns:a16="http://schemas.microsoft.com/office/drawing/2014/main" id="{A308FAB1-917D-1D41-AB2F-F2E62339DA5B}"/>
+              </a:ext>
+            </a:extLst>
+          </p:cNvPr>
+          <p:cNvSpPr>
+            <a:spLocks noGrp="1"/>
+          </p:cNvSpPr>
+          <p:nvPr>
+            <p:ph type="title"/>
+          </p:nvPr>
+        </p:nvSpPr>
+        <p:spPr/>
+        <p:txBody>
+          <a:bodyPr/>
+          <a:lstStyle/>
+          <a:p>
+            <a:r>
+              <a:rPr lang="en-VN" dirty="0"/>
+              <a:t>XCTest</a:t>
+            </a:r>
+          </a:p>
+        </p:txBody>
+      </p:sp>
+      <p:sp>
+        <p:nvSpPr>
+          <p:cNvPr id="3" name="Content Placeholder 2">
+            <a:extLst>
+              <a:ext uri="{FF2B5EF4-FFF2-40B4-BE49-F238E27FC236}">
+                <a16:creationId xmlns:a16="http://schemas.microsoft.com/office/drawing/2014/main" id="{41DEA4D2-3EBB-5B49-B8A2-DCEA1976FDD6}"/>
+              </a:ext>
+            </a:extLst>
+          </p:cNvPr>
+          <p:cNvSpPr>
+            <a:spLocks noGrp="1"/>
+          </p:cNvSpPr>
+          <p:nvPr>
+            <p:ph idx="1"/>
+          </p:nvPr>
+        </p:nvSpPr>
+        <p:spPr/>
+        <p:txBody>
+          <a:bodyPr/>
+          <a:lstStyle/>
+          <a:p>
+            <a:r>
+              <a:rPr lang="en-VN" dirty="0"/>
+              <a:t>Introduced in Xcode 5 in 2013.</a:t>
+            </a:r>
+          </a:p>
+        </p:txBody>
+      </p:sp>
+    </p:spTree>
+    <p:extLst>
+      <p:ext uri="{BB962C8B-B14F-4D97-AF65-F5344CB8AC3E}">
+        <p14:creationId xmlns:p14="http://schemas.microsoft.com/office/powerpoint/2010/main" val="2785250636"/>
+      </p:ext>
+    </p:extLst>
+  </p:cSld>
+  <p:clrMapOvr>
+    <a:masterClrMapping/>
+  </p:clrMapOvr>
+</p:sld>
+</file>
+
+<file path=ppt/slides/slide13.xml><?xml version="1.0" encoding="utf-8"?>
+<p:sld xmlns:a="http://schemas.openxmlformats.org/drawingml/2006/main" xmlns:r="http://schemas.openxmlformats.org/officeDocument/2006/relationships" xmlns:p="http://schemas.openxmlformats.org/presentationml/2006/main">
+  <p:cSld>
+    <p:spTree>
+      <p:nvGrpSpPr>
+        <p:cNvPr id="1" name=""/>
+        <p:cNvGrpSpPr/>
+        <p:nvPr/>
+      </p:nvGrpSpPr>
+      <p:grpSpPr>
+        <a:xfrm>
+          <a:off x="0" y="0"/>
+          <a:ext cx="0" cy="0"/>
+          <a:chOff x="0" y="0"/>
+          <a:chExt cx="0" cy="0"/>
+        </a:xfrm>
+      </p:grpSpPr>
+      <p:sp>
+        <p:nvSpPr>
+          <p:cNvPr id="2" name="Title 1">
+            <a:extLst>
+              <a:ext uri="{FF2B5EF4-FFF2-40B4-BE49-F238E27FC236}">
                 <a16:creationId xmlns:a16="http://schemas.microsoft.com/office/drawing/2014/main" id="{F9AF15DA-0F01-564C-9D32-0DFB38BD464D}"/>
               </a:ext>
             </a:extLst>
@@ -4316,10 +4408,10 @@
       </p:sp>
       <p:pic>
         <p:nvPicPr>
-          <p:cNvPr id="5" name="Picture 4">
-            <a:extLst>
-              <a:ext uri="{FF2B5EF4-FFF2-40B4-BE49-F238E27FC236}">
-                <a16:creationId xmlns:a16="http://schemas.microsoft.com/office/drawing/2014/main" id="{E9AA3AA2-4A74-CB4B-87A3-167E6E9A0224}"/>
+          <p:cNvPr id="6" name="Picture 5">
+            <a:extLst>
+              <a:ext uri="{FF2B5EF4-FFF2-40B4-BE49-F238E27FC236}">
+                <a16:creationId xmlns:a16="http://schemas.microsoft.com/office/drawing/2014/main" id="{AF962D42-B4F7-A946-BCFF-FD7BF566D4BB}"/>
               </a:ext>
             </a:extLst>
           </p:cNvPr>
@@ -4336,8 +4428,8 @@
         </p:blipFill>
         <p:spPr>
           <a:xfrm>
-            <a:off x="1522846" y="3408506"/>
-            <a:ext cx="3138107" cy="873414"/>
+            <a:off x="1514528" y="3350302"/>
+            <a:ext cx="3136900" cy="876300"/>
           </a:xfrm>
           <a:prstGeom prst="rect">
             <a:avLst/>

</xml_diff>